<commit_message>
(My Week 3 commit)
</commit_message>
<xml_diff>
--- a/Week_3/Presentation1.pptx
+++ b/Week_3/Presentation1.pptx
@@ -6,6 +6,7 @@
   </p:sldMasterIdLst>
   <p:sldIdLst>
     <p:sldId id="258" r:id="rId2"/>
+    <p:sldId id="259" r:id="rId3"/>
   </p:sldIdLst>
   <p:sldSz cx="12192000" cy="6858000"/>
   <p:notesSz cx="6858000" cy="9144000"/>
@@ -104,6 +105,11 @@
       </a:defRPr>
     </a:lvl9pPr>
   </p:defaultTextStyle>
+  <p:extLst>
+    <p:ext uri="{EFAFB233-063F-42B5-8137-9DF3F51BA10A}">
+      <p15:sldGuideLst xmlns:p15="http://schemas.microsoft.com/office/powerpoint/2012/main"/>
+    </p:ext>
+  </p:extLst>
 </p:presentation>
 </file>
 
@@ -3371,7 +3377,7 @@
         </p:nvSpPr>
         <p:spPr>
           <a:xfrm>
-            <a:off x="1001027" y="712269"/>
+            <a:off x="951305" y="692823"/>
             <a:ext cx="1206367" cy="904775"/>
           </a:xfrm>
           <a:prstGeom prst="ellipse">
@@ -3518,7 +3524,7 @@
         </p:nvSpPr>
         <p:spPr>
           <a:xfrm>
-            <a:off x="5935578" y="818146"/>
+            <a:off x="6054289" y="847817"/>
             <a:ext cx="2261937" cy="693019"/>
           </a:xfrm>
           <a:prstGeom prst="parallelogram">
@@ -3567,8 +3573,8 @@
         </p:nvSpPr>
         <p:spPr>
           <a:xfrm>
-            <a:off x="9490509" y="2107933"/>
-            <a:ext cx="2242685" cy="693019"/>
+            <a:off x="9374211" y="2077283"/>
+            <a:ext cx="2358981" cy="693019"/>
           </a:xfrm>
           <a:prstGeom prst="rect">
             <a:avLst/>
@@ -3865,7 +3871,7 @@
         </p:nvSpPr>
         <p:spPr>
           <a:xfrm>
-            <a:off x="537411" y="2213809"/>
+            <a:off x="601588" y="3931919"/>
             <a:ext cx="1905802" cy="693019"/>
           </a:xfrm>
           <a:prstGeom prst="rect">
@@ -3914,7 +3920,7 @@
         </p:nvSpPr>
         <p:spPr>
           <a:xfrm>
-            <a:off x="3561347" y="3821228"/>
+            <a:off x="6668736" y="3922293"/>
             <a:ext cx="1206367" cy="904775"/>
           </a:xfrm>
           <a:prstGeom prst="ellipse">
@@ -3960,13 +3966,12 @@
           </p:cNvPr>
           <p:cNvCxnSpPr>
             <a:cxnSpLocks/>
-            <a:stCxn id="3" idx="6"/>
           </p:cNvCxnSpPr>
           <p:nvPr/>
         </p:nvCxnSpPr>
         <p:spPr>
           <a:xfrm flipV="1">
-            <a:off x="2207394" y="1164655"/>
+            <a:off x="2130408" y="1152979"/>
             <a:ext cx="911191" cy="2"/>
           </a:xfrm>
           <a:prstGeom prst="straightConnector1">
@@ -4286,7 +4291,7 @@
         </p:nvSpPr>
         <p:spPr>
           <a:xfrm>
-            <a:off x="487679" y="3954381"/>
+            <a:off x="3118585" y="3952777"/>
             <a:ext cx="1905802" cy="693019"/>
           </a:xfrm>
           <a:prstGeom prst="rect">
@@ -4316,7 +4321,7 @@
             <a:pPr algn="ctr"/>
             <a:r>
               <a:rPr lang="en-US" dirty="0"/>
-              <a:t>CONFIRM ORDER</a:t>
+              <a:t>CHECKOUT</a:t>
             </a:r>
           </a:p>
         </p:txBody>
@@ -4337,7 +4342,7 @@
         </p:nvCxnSpPr>
         <p:spPr>
           <a:xfrm>
-            <a:off x="1490312" y="2752639"/>
+            <a:off x="1554489" y="2752639"/>
             <a:ext cx="0" cy="1129368"/>
           </a:xfrm>
           <a:prstGeom prst="straightConnector1">
@@ -4373,14 +4378,1034 @@
           </p:cNvPr>
           <p:cNvCxnSpPr>
             <a:cxnSpLocks/>
-            <a:stCxn id="43" idx="3"/>
           </p:cNvCxnSpPr>
           <p:nvPr/>
         </p:nvCxnSpPr>
         <p:spPr>
           <a:xfrm flipV="1">
-            <a:off x="2393481" y="4299287"/>
+            <a:off x="2018105" y="4299286"/>
             <a:ext cx="1049156" cy="1604"/>
+          </a:xfrm>
+          <a:prstGeom prst="straightConnector1">
+            <a:avLst/>
+          </a:prstGeom>
+          <a:ln>
+            <a:tailEnd type="triangle"/>
+          </a:ln>
+        </p:spPr>
+        <p:style>
+          <a:lnRef idx="1">
+            <a:schemeClr val="accent1"/>
+          </a:lnRef>
+          <a:fillRef idx="0">
+            <a:schemeClr val="accent1"/>
+          </a:fillRef>
+          <a:effectRef idx="0">
+            <a:schemeClr val="accent1"/>
+          </a:effectRef>
+          <a:fontRef idx="minor">
+            <a:schemeClr val="tx1"/>
+          </a:fontRef>
+        </p:style>
+      </p:cxnSp>
+      <p:cxnSp>
+        <p:nvCxnSpPr>
+          <p:cNvPr id="10" name="Straight Arrow Connector 9">
+            <a:extLst>
+              <a:ext uri="{FF2B5EF4-FFF2-40B4-BE49-F238E27FC236}">
+                <a16:creationId xmlns:a16="http://schemas.microsoft.com/office/drawing/2014/main" id="{A63FF6B3-3C4E-266D-BE51-04A3BBD547E9}"/>
+              </a:ext>
+            </a:extLst>
+          </p:cNvPr>
+          <p:cNvCxnSpPr>
+            <a:cxnSpLocks/>
+          </p:cNvCxnSpPr>
+          <p:nvPr/>
+        </p:nvCxnSpPr>
+        <p:spPr>
+          <a:xfrm>
+            <a:off x="4966637" y="4299286"/>
+            <a:ext cx="1634683" cy="0"/>
+          </a:xfrm>
+          <a:prstGeom prst="straightConnector1">
+            <a:avLst/>
+          </a:prstGeom>
+          <a:ln>
+            <a:tailEnd type="triangle"/>
+          </a:ln>
+        </p:spPr>
+        <p:style>
+          <a:lnRef idx="1">
+            <a:schemeClr val="accent1"/>
+          </a:lnRef>
+          <a:fillRef idx="0">
+            <a:schemeClr val="accent1"/>
+          </a:fillRef>
+          <a:effectRef idx="0">
+            <a:schemeClr val="accent1"/>
+          </a:effectRef>
+          <a:fontRef idx="minor">
+            <a:schemeClr val="tx1"/>
+          </a:fontRef>
+        </p:style>
+      </p:cxnSp>
+      <p:sp>
+        <p:nvSpPr>
+          <p:cNvPr id="11" name="Rectangle 10">
+            <a:extLst>
+              <a:ext uri="{FF2B5EF4-FFF2-40B4-BE49-F238E27FC236}">
+                <a16:creationId xmlns:a16="http://schemas.microsoft.com/office/drawing/2014/main" id="{A266E94A-B32E-CA91-40F8-DCEC3FA905B7}"/>
+              </a:ext>
+            </a:extLst>
+          </p:cNvPr>
+          <p:cNvSpPr/>
+          <p:nvPr/>
+        </p:nvSpPr>
+        <p:spPr>
+          <a:xfrm>
+            <a:off x="604782" y="2202579"/>
+            <a:ext cx="1905802" cy="693019"/>
+          </a:xfrm>
+          <a:prstGeom prst="rect">
+            <a:avLst/>
+          </a:prstGeom>
+        </p:spPr>
+        <p:style>
+          <a:lnRef idx="2">
+            <a:schemeClr val="accent1">
+              <a:shade val="50000"/>
+            </a:schemeClr>
+          </a:lnRef>
+          <a:fillRef idx="1">
+            <a:schemeClr val="accent1"/>
+          </a:fillRef>
+          <a:effectRef idx="0">
+            <a:schemeClr val="accent1"/>
+          </a:effectRef>
+          <a:fontRef idx="minor">
+            <a:schemeClr val="lt1"/>
+          </a:fontRef>
+        </p:style>
+        <p:txBody>
+          <a:bodyPr rtlCol="0" anchor="ctr"/>
+          <a:lstStyle/>
+          <a:p>
+            <a:pPr algn="ctr"/>
+            <a:r>
+              <a:rPr lang="en-US" dirty="0"/>
+              <a:t>CONFIRM ORDER</a:t>
+            </a:r>
+          </a:p>
+        </p:txBody>
+      </p:sp>
+    </p:spTree>
+    <p:extLst>
+      <p:ext uri="{BB962C8B-B14F-4D97-AF65-F5344CB8AC3E}">
+        <p14:creationId xmlns:p14="http://schemas.microsoft.com/office/powerpoint/2010/main" val="1867408643"/>
+      </p:ext>
+    </p:extLst>
+  </p:cSld>
+  <p:clrMapOvr>
+    <a:masterClrMapping/>
+  </p:clrMapOvr>
+</p:sld>
+</file>
+
+<file path=ppt/slides/slide2.xml><?xml version="1.0" encoding="utf-8"?>
+<p:sld xmlns:a="http://schemas.openxmlformats.org/drawingml/2006/main" xmlns:r="http://schemas.openxmlformats.org/officeDocument/2006/relationships" xmlns:p="http://schemas.openxmlformats.org/presentationml/2006/main">
+  <p:cSld>
+    <p:spTree>
+      <p:nvGrpSpPr>
+        <p:cNvPr id="1" name=""/>
+        <p:cNvGrpSpPr/>
+        <p:nvPr/>
+      </p:nvGrpSpPr>
+      <p:grpSpPr>
+        <a:xfrm>
+          <a:off x="0" y="0"/>
+          <a:ext cx="0" cy="0"/>
+          <a:chOff x="0" y="0"/>
+          <a:chExt cx="0" cy="0"/>
+        </a:xfrm>
+      </p:grpSpPr>
+      <p:sp>
+        <p:nvSpPr>
+          <p:cNvPr id="3" name="TextBox 2">
+            <a:extLst>
+              <a:ext uri="{FF2B5EF4-FFF2-40B4-BE49-F238E27FC236}">
+                <a16:creationId xmlns:a16="http://schemas.microsoft.com/office/drawing/2014/main" id="{CA96F15D-B71E-FE20-5CF2-B175467D19CB}"/>
+              </a:ext>
+            </a:extLst>
+          </p:cNvPr>
+          <p:cNvSpPr txBox="1"/>
+          <p:nvPr/>
+        </p:nvSpPr>
+        <p:spPr>
+          <a:xfrm>
+            <a:off x="3164305" y="31282"/>
+            <a:ext cx="6097604" cy="369332"/>
+          </a:xfrm>
+          <a:prstGeom prst="rect">
+            <a:avLst/>
+          </a:prstGeom>
+          <a:noFill/>
+        </p:spPr>
+        <p:txBody>
+          <a:bodyPr wrap="square">
+            <a:spAutoFit/>
+          </a:bodyPr>
+          <a:lstStyle/>
+          <a:p>
+            <a:pPr algn="ctr"/>
+            <a:r>
+              <a:rPr lang="en-US" dirty="0"/>
+              <a:t>TYPICAL WEEKDAY MORNING</a:t>
+            </a:r>
+          </a:p>
+        </p:txBody>
+      </p:sp>
+      <p:sp>
+        <p:nvSpPr>
+          <p:cNvPr id="4" name="Oval 3">
+            <a:extLst>
+              <a:ext uri="{FF2B5EF4-FFF2-40B4-BE49-F238E27FC236}">
+                <a16:creationId xmlns:a16="http://schemas.microsoft.com/office/drawing/2014/main" id="{2CB1669D-CA78-03F9-362B-543A08DEDB94}"/>
+              </a:ext>
+            </a:extLst>
+          </p:cNvPr>
+          <p:cNvSpPr/>
+          <p:nvPr/>
+        </p:nvSpPr>
+        <p:spPr>
+          <a:xfrm>
+            <a:off x="721891" y="1607420"/>
+            <a:ext cx="1636295" cy="904775"/>
+          </a:xfrm>
+          <a:prstGeom prst="ellipse">
+            <a:avLst/>
+          </a:prstGeom>
+        </p:spPr>
+        <p:style>
+          <a:lnRef idx="2">
+            <a:schemeClr val="accent1">
+              <a:shade val="50000"/>
+            </a:schemeClr>
+          </a:lnRef>
+          <a:fillRef idx="1">
+            <a:schemeClr val="accent1"/>
+          </a:fillRef>
+          <a:effectRef idx="0">
+            <a:schemeClr val="accent1"/>
+          </a:effectRef>
+          <a:fontRef idx="minor">
+            <a:schemeClr val="lt1"/>
+          </a:fontRef>
+        </p:style>
+        <p:txBody>
+          <a:bodyPr rtlCol="0" anchor="ctr"/>
+          <a:lstStyle/>
+          <a:p>
+            <a:pPr algn="ctr"/>
+            <a:r>
+              <a:rPr lang="en-US" dirty="0"/>
+              <a:t>WAKE UP</a:t>
+            </a:r>
+          </a:p>
+        </p:txBody>
+      </p:sp>
+      <p:cxnSp>
+        <p:nvCxnSpPr>
+          <p:cNvPr id="6" name="Straight Arrow Connector 5">
+            <a:extLst>
+              <a:ext uri="{FF2B5EF4-FFF2-40B4-BE49-F238E27FC236}">
+                <a16:creationId xmlns:a16="http://schemas.microsoft.com/office/drawing/2014/main" id="{6B220728-C281-A5FE-603D-495A46ED9FCD}"/>
+              </a:ext>
+            </a:extLst>
+          </p:cNvPr>
+          <p:cNvCxnSpPr>
+            <a:cxnSpLocks/>
+            <a:stCxn id="4" idx="6"/>
+          </p:cNvCxnSpPr>
+          <p:nvPr/>
+        </p:nvCxnSpPr>
+        <p:spPr>
+          <a:xfrm>
+            <a:off x="2358186" y="2059808"/>
+            <a:ext cx="1010653" cy="0"/>
+          </a:xfrm>
+          <a:prstGeom prst="straightConnector1">
+            <a:avLst/>
+          </a:prstGeom>
+          <a:ln>
+            <a:tailEnd type="triangle"/>
+          </a:ln>
+        </p:spPr>
+        <p:style>
+          <a:lnRef idx="1">
+            <a:schemeClr val="accent1"/>
+          </a:lnRef>
+          <a:fillRef idx="0">
+            <a:schemeClr val="accent1"/>
+          </a:fillRef>
+          <a:effectRef idx="0">
+            <a:schemeClr val="accent1"/>
+          </a:effectRef>
+          <a:fontRef idx="minor">
+            <a:schemeClr val="tx1"/>
+          </a:fontRef>
+        </p:style>
+      </p:cxnSp>
+      <p:cxnSp>
+        <p:nvCxnSpPr>
+          <p:cNvPr id="12" name="Straight Arrow Connector 11">
+            <a:extLst>
+              <a:ext uri="{FF2B5EF4-FFF2-40B4-BE49-F238E27FC236}">
+                <a16:creationId xmlns:a16="http://schemas.microsoft.com/office/drawing/2014/main" id="{BA9931B6-4982-C5FD-EDBF-6A8AE43936C4}"/>
+              </a:ext>
+            </a:extLst>
+          </p:cNvPr>
+          <p:cNvCxnSpPr>
+            <a:cxnSpLocks/>
+          </p:cNvCxnSpPr>
+          <p:nvPr/>
+        </p:nvCxnSpPr>
+        <p:spPr>
+          <a:xfrm>
+            <a:off x="5433457" y="2075846"/>
+            <a:ext cx="1010653" cy="0"/>
+          </a:xfrm>
+          <a:prstGeom prst="straightConnector1">
+            <a:avLst/>
+          </a:prstGeom>
+          <a:ln>
+            <a:tailEnd type="triangle"/>
+          </a:ln>
+        </p:spPr>
+        <p:style>
+          <a:lnRef idx="1">
+            <a:schemeClr val="accent1"/>
+          </a:lnRef>
+          <a:fillRef idx="0">
+            <a:schemeClr val="accent1"/>
+          </a:fillRef>
+          <a:effectRef idx="0">
+            <a:schemeClr val="accent1"/>
+          </a:effectRef>
+          <a:fontRef idx="minor">
+            <a:schemeClr val="tx1"/>
+          </a:fontRef>
+        </p:style>
+      </p:cxnSp>
+      <p:sp>
+        <p:nvSpPr>
+          <p:cNvPr id="15" name="Rectangle 14">
+            <a:extLst>
+              <a:ext uri="{FF2B5EF4-FFF2-40B4-BE49-F238E27FC236}">
+                <a16:creationId xmlns:a16="http://schemas.microsoft.com/office/drawing/2014/main" id="{E5634D10-4CCE-EBB6-692D-5F264053205C}"/>
+              </a:ext>
+            </a:extLst>
+          </p:cNvPr>
+          <p:cNvSpPr/>
+          <p:nvPr/>
+        </p:nvSpPr>
+        <p:spPr>
+          <a:xfrm>
+            <a:off x="3368839" y="1718117"/>
+            <a:ext cx="2128789" cy="683380"/>
+          </a:xfrm>
+          <a:prstGeom prst="rect">
+            <a:avLst/>
+          </a:prstGeom>
+        </p:spPr>
+        <p:style>
+          <a:lnRef idx="2">
+            <a:schemeClr val="accent1">
+              <a:shade val="50000"/>
+            </a:schemeClr>
+          </a:lnRef>
+          <a:fillRef idx="1">
+            <a:schemeClr val="accent1"/>
+          </a:fillRef>
+          <a:effectRef idx="0">
+            <a:schemeClr val="accent1"/>
+          </a:effectRef>
+          <a:fontRef idx="minor">
+            <a:schemeClr val="lt1"/>
+          </a:fontRef>
+        </p:style>
+        <p:txBody>
+          <a:bodyPr rtlCol="0" anchor="ctr"/>
+          <a:lstStyle/>
+          <a:p>
+            <a:pPr algn="ctr"/>
+            <a:r>
+              <a:rPr lang="en-US" dirty="0"/>
+              <a:t>PRAY TO GOD</a:t>
+            </a:r>
+          </a:p>
+        </p:txBody>
+      </p:sp>
+      <p:sp>
+        <p:nvSpPr>
+          <p:cNvPr id="16" name="Rectangle 15">
+            <a:extLst>
+              <a:ext uri="{FF2B5EF4-FFF2-40B4-BE49-F238E27FC236}">
+                <a16:creationId xmlns:a16="http://schemas.microsoft.com/office/drawing/2014/main" id="{57306FA2-151E-683A-030E-E09541B720AC}"/>
+              </a:ext>
+            </a:extLst>
+          </p:cNvPr>
+          <p:cNvSpPr/>
+          <p:nvPr/>
+        </p:nvSpPr>
+        <p:spPr>
+          <a:xfrm>
+            <a:off x="6444110" y="1724530"/>
+            <a:ext cx="2447223" cy="683378"/>
+          </a:xfrm>
+          <a:prstGeom prst="rect">
+            <a:avLst/>
+          </a:prstGeom>
+        </p:spPr>
+        <p:style>
+          <a:lnRef idx="2">
+            <a:schemeClr val="accent1">
+              <a:shade val="50000"/>
+            </a:schemeClr>
+          </a:lnRef>
+          <a:fillRef idx="1">
+            <a:schemeClr val="accent1"/>
+          </a:fillRef>
+          <a:effectRef idx="0">
+            <a:schemeClr val="accent1"/>
+          </a:effectRef>
+          <a:fontRef idx="minor">
+            <a:schemeClr val="lt1"/>
+          </a:fontRef>
+        </p:style>
+        <p:txBody>
+          <a:bodyPr rtlCol="0" anchor="ctr"/>
+          <a:lstStyle/>
+          <a:p>
+            <a:pPr algn="ctr"/>
+            <a:r>
+              <a:rPr lang="en-US" dirty="0"/>
+              <a:t>GO THROUGH EMAILS</a:t>
+            </a:r>
+          </a:p>
+        </p:txBody>
+      </p:sp>
+      <p:cxnSp>
+        <p:nvCxnSpPr>
+          <p:cNvPr id="17" name="Straight Arrow Connector 16">
+            <a:extLst>
+              <a:ext uri="{FF2B5EF4-FFF2-40B4-BE49-F238E27FC236}">
+                <a16:creationId xmlns:a16="http://schemas.microsoft.com/office/drawing/2014/main" id="{E48295CB-C082-424C-85DF-A2A0AC9A998E}"/>
+              </a:ext>
+            </a:extLst>
+          </p:cNvPr>
+          <p:cNvCxnSpPr>
+            <a:cxnSpLocks/>
+          </p:cNvCxnSpPr>
+          <p:nvPr/>
+        </p:nvCxnSpPr>
+        <p:spPr>
+          <a:xfrm>
+            <a:off x="8694825" y="2074243"/>
+            <a:ext cx="747556" cy="1603"/>
+          </a:xfrm>
+          <a:prstGeom prst="straightConnector1">
+            <a:avLst/>
+          </a:prstGeom>
+          <a:ln>
+            <a:tailEnd type="triangle"/>
+          </a:ln>
+        </p:spPr>
+        <p:style>
+          <a:lnRef idx="1">
+            <a:schemeClr val="accent1"/>
+          </a:lnRef>
+          <a:fillRef idx="0">
+            <a:schemeClr val="accent1"/>
+          </a:fillRef>
+          <a:effectRef idx="0">
+            <a:schemeClr val="accent1"/>
+          </a:effectRef>
+          <a:fontRef idx="minor">
+            <a:schemeClr val="tx1"/>
+          </a:fontRef>
+        </p:style>
+      </p:cxnSp>
+      <p:sp>
+        <p:nvSpPr>
+          <p:cNvPr id="19" name="Rectangle 18">
+            <a:extLst>
+              <a:ext uri="{FF2B5EF4-FFF2-40B4-BE49-F238E27FC236}">
+                <a16:creationId xmlns:a16="http://schemas.microsoft.com/office/drawing/2014/main" id="{649AA73F-9EA2-8036-92B1-A5BBF82CE304}"/>
+              </a:ext>
+            </a:extLst>
+          </p:cNvPr>
+          <p:cNvSpPr/>
+          <p:nvPr/>
+        </p:nvSpPr>
+        <p:spPr>
+          <a:xfrm>
+            <a:off x="9445596" y="1761428"/>
+            <a:ext cx="2364600" cy="683378"/>
+          </a:xfrm>
+          <a:prstGeom prst="rect">
+            <a:avLst/>
+          </a:prstGeom>
+        </p:spPr>
+        <p:style>
+          <a:lnRef idx="2">
+            <a:schemeClr val="accent1">
+              <a:shade val="50000"/>
+            </a:schemeClr>
+          </a:lnRef>
+          <a:fillRef idx="1">
+            <a:schemeClr val="accent1"/>
+          </a:fillRef>
+          <a:effectRef idx="0">
+            <a:schemeClr val="accent1"/>
+          </a:effectRef>
+          <a:fontRef idx="minor">
+            <a:schemeClr val="lt1"/>
+          </a:fontRef>
+        </p:style>
+        <p:txBody>
+          <a:bodyPr rtlCol="0" anchor="ctr"/>
+          <a:lstStyle/>
+          <a:p>
+            <a:pPr algn="ctr"/>
+            <a:r>
+              <a:rPr lang="en-US" dirty="0"/>
+              <a:t>BRUSH MY TEETH AND HAVE A BATH</a:t>
+            </a:r>
+          </a:p>
+        </p:txBody>
+      </p:sp>
+      <p:sp>
+        <p:nvSpPr>
+          <p:cNvPr id="20" name="Rectangle 19">
+            <a:extLst>
+              <a:ext uri="{FF2B5EF4-FFF2-40B4-BE49-F238E27FC236}">
+                <a16:creationId xmlns:a16="http://schemas.microsoft.com/office/drawing/2014/main" id="{4C5FF4AF-BDF1-7D6C-0B7F-81E3BF4B6B72}"/>
+              </a:ext>
+            </a:extLst>
+          </p:cNvPr>
+          <p:cNvSpPr/>
+          <p:nvPr/>
+        </p:nvSpPr>
+        <p:spPr>
+          <a:xfrm>
+            <a:off x="9501744" y="3059236"/>
+            <a:ext cx="2364600" cy="683378"/>
+          </a:xfrm>
+          <a:prstGeom prst="rect">
+            <a:avLst/>
+          </a:prstGeom>
+        </p:spPr>
+        <p:style>
+          <a:lnRef idx="2">
+            <a:schemeClr val="accent1">
+              <a:shade val="50000"/>
+            </a:schemeClr>
+          </a:lnRef>
+          <a:fillRef idx="1">
+            <a:schemeClr val="accent1"/>
+          </a:fillRef>
+          <a:effectRef idx="0">
+            <a:schemeClr val="accent1"/>
+          </a:effectRef>
+          <a:fontRef idx="minor">
+            <a:schemeClr val="lt1"/>
+          </a:fontRef>
+        </p:style>
+        <p:txBody>
+          <a:bodyPr rtlCol="0" anchor="ctr"/>
+          <a:lstStyle/>
+          <a:p>
+            <a:pPr algn="ctr"/>
+            <a:r>
+              <a:rPr lang="en-US" dirty="0"/>
+              <a:t>PREPARE BREAKFAST</a:t>
+            </a:r>
+          </a:p>
+        </p:txBody>
+      </p:sp>
+      <p:cxnSp>
+        <p:nvCxnSpPr>
+          <p:cNvPr id="22" name="Straight Arrow Connector 21">
+            <a:extLst>
+              <a:ext uri="{FF2B5EF4-FFF2-40B4-BE49-F238E27FC236}">
+                <a16:creationId xmlns:a16="http://schemas.microsoft.com/office/drawing/2014/main" id="{02D0F132-1E61-23E5-D927-92C38F27848C}"/>
+              </a:ext>
+            </a:extLst>
+          </p:cNvPr>
+          <p:cNvCxnSpPr>
+            <a:cxnSpLocks/>
+            <a:stCxn id="19" idx="2"/>
+          </p:cNvCxnSpPr>
+          <p:nvPr/>
+        </p:nvCxnSpPr>
+        <p:spPr>
+          <a:xfrm>
+            <a:off x="10627896" y="2444806"/>
+            <a:ext cx="0" cy="614430"/>
+          </a:xfrm>
+          <a:prstGeom prst="straightConnector1">
+            <a:avLst/>
+          </a:prstGeom>
+          <a:ln>
+            <a:tailEnd type="triangle"/>
+          </a:ln>
+        </p:spPr>
+        <p:style>
+          <a:lnRef idx="1">
+            <a:schemeClr val="accent1"/>
+          </a:lnRef>
+          <a:fillRef idx="0">
+            <a:schemeClr val="accent1"/>
+          </a:fillRef>
+          <a:effectRef idx="0">
+            <a:schemeClr val="accent1"/>
+          </a:effectRef>
+          <a:fontRef idx="minor">
+            <a:schemeClr val="tx1"/>
+          </a:fontRef>
+        </p:style>
+      </p:cxnSp>
+      <p:sp>
+        <p:nvSpPr>
+          <p:cNvPr id="25" name="Rectangle 24">
+            <a:extLst>
+              <a:ext uri="{FF2B5EF4-FFF2-40B4-BE49-F238E27FC236}">
+                <a16:creationId xmlns:a16="http://schemas.microsoft.com/office/drawing/2014/main" id="{FEBBE696-DE28-60AA-0D29-11EB473E6B84}"/>
+              </a:ext>
+            </a:extLst>
+          </p:cNvPr>
+          <p:cNvSpPr/>
+          <p:nvPr/>
+        </p:nvSpPr>
+        <p:spPr>
+          <a:xfrm>
+            <a:off x="6516302" y="3057635"/>
+            <a:ext cx="2364600" cy="683378"/>
+          </a:xfrm>
+          <a:prstGeom prst="rect">
+            <a:avLst/>
+          </a:prstGeom>
+        </p:spPr>
+        <p:style>
+          <a:lnRef idx="2">
+            <a:schemeClr val="accent1">
+              <a:shade val="50000"/>
+            </a:schemeClr>
+          </a:lnRef>
+          <a:fillRef idx="1">
+            <a:schemeClr val="accent1"/>
+          </a:fillRef>
+          <a:effectRef idx="0">
+            <a:schemeClr val="accent1"/>
+          </a:effectRef>
+          <a:fontRef idx="minor">
+            <a:schemeClr val="lt1"/>
+          </a:fontRef>
+        </p:style>
+        <p:txBody>
+          <a:bodyPr rtlCol="0" anchor="ctr"/>
+          <a:lstStyle/>
+          <a:p>
+            <a:pPr algn="ctr"/>
+            <a:r>
+              <a:rPr lang="en-US" dirty="0"/>
+              <a:t>EAT BREAKFAST</a:t>
+            </a:r>
+          </a:p>
+        </p:txBody>
+      </p:sp>
+      <p:cxnSp>
+        <p:nvCxnSpPr>
+          <p:cNvPr id="27" name="Straight Arrow Connector 26">
+            <a:extLst>
+              <a:ext uri="{FF2B5EF4-FFF2-40B4-BE49-F238E27FC236}">
+                <a16:creationId xmlns:a16="http://schemas.microsoft.com/office/drawing/2014/main" id="{7C9128DA-9ECB-4418-6F96-18D1E153DF41}"/>
+              </a:ext>
+            </a:extLst>
+          </p:cNvPr>
+          <p:cNvCxnSpPr>
+            <a:cxnSpLocks/>
+            <a:endCxn id="25" idx="3"/>
+          </p:cNvCxnSpPr>
+          <p:nvPr/>
+        </p:nvCxnSpPr>
+        <p:spPr>
+          <a:xfrm flipH="1" flipV="1">
+            <a:off x="8880902" y="3399324"/>
+            <a:ext cx="649718" cy="1601"/>
+          </a:xfrm>
+          <a:prstGeom prst="straightConnector1">
+            <a:avLst/>
+          </a:prstGeom>
+          <a:ln>
+            <a:tailEnd type="triangle"/>
+          </a:ln>
+        </p:spPr>
+        <p:style>
+          <a:lnRef idx="1">
+            <a:schemeClr val="accent1"/>
+          </a:lnRef>
+          <a:fillRef idx="0">
+            <a:schemeClr val="accent1"/>
+          </a:fillRef>
+          <a:effectRef idx="0">
+            <a:schemeClr val="accent1"/>
+          </a:effectRef>
+          <a:fontRef idx="minor">
+            <a:schemeClr val="tx1"/>
+          </a:fontRef>
+        </p:style>
+      </p:cxnSp>
+      <p:sp>
+        <p:nvSpPr>
+          <p:cNvPr id="28" name="Rectangle 27">
+            <a:extLst>
+              <a:ext uri="{FF2B5EF4-FFF2-40B4-BE49-F238E27FC236}">
+                <a16:creationId xmlns:a16="http://schemas.microsoft.com/office/drawing/2014/main" id="{B0252FB5-DD8D-F803-DA8B-2A80496070A9}"/>
+              </a:ext>
+            </a:extLst>
+          </p:cNvPr>
+          <p:cNvSpPr/>
+          <p:nvPr/>
+        </p:nvSpPr>
+        <p:spPr>
+          <a:xfrm>
+            <a:off x="3278205" y="3057635"/>
+            <a:ext cx="2364600" cy="683378"/>
+          </a:xfrm>
+          <a:prstGeom prst="rect">
+            <a:avLst/>
+          </a:prstGeom>
+        </p:spPr>
+        <p:style>
+          <a:lnRef idx="2">
+            <a:schemeClr val="accent1">
+              <a:shade val="50000"/>
+            </a:schemeClr>
+          </a:lnRef>
+          <a:fillRef idx="1">
+            <a:schemeClr val="accent1"/>
+          </a:fillRef>
+          <a:effectRef idx="0">
+            <a:schemeClr val="accent1"/>
+          </a:effectRef>
+          <a:fontRef idx="minor">
+            <a:schemeClr val="lt1"/>
+          </a:fontRef>
+        </p:style>
+        <p:txBody>
+          <a:bodyPr rtlCol="0" anchor="ctr"/>
+          <a:lstStyle/>
+          <a:p>
+            <a:pPr algn="ctr"/>
+            <a:r>
+              <a:rPr lang="en-US" sz="1600" dirty="0"/>
+              <a:t>ARRANGE SCHOOL NOTES IN MY SCHOOL BAG</a:t>
+            </a:r>
+          </a:p>
+        </p:txBody>
+      </p:sp>
+      <p:cxnSp>
+        <p:nvCxnSpPr>
+          <p:cNvPr id="29" name="Straight Arrow Connector 28">
+            <a:extLst>
+              <a:ext uri="{FF2B5EF4-FFF2-40B4-BE49-F238E27FC236}">
+                <a16:creationId xmlns:a16="http://schemas.microsoft.com/office/drawing/2014/main" id="{991EC346-F4E0-70C5-A141-E63A2B70B0CF}"/>
+              </a:ext>
+            </a:extLst>
+          </p:cNvPr>
+          <p:cNvCxnSpPr>
+            <a:cxnSpLocks/>
+            <a:stCxn id="25" idx="1"/>
+            <a:endCxn id="28" idx="3"/>
+          </p:cNvCxnSpPr>
+          <p:nvPr/>
+        </p:nvCxnSpPr>
+        <p:spPr>
+          <a:xfrm flipH="1">
+            <a:off x="5642805" y="3399324"/>
+            <a:ext cx="873497" cy="0"/>
+          </a:xfrm>
+          <a:prstGeom prst="straightConnector1">
+            <a:avLst/>
+          </a:prstGeom>
+          <a:ln>
+            <a:tailEnd type="triangle"/>
+          </a:ln>
+        </p:spPr>
+        <p:style>
+          <a:lnRef idx="1">
+            <a:schemeClr val="accent1"/>
+          </a:lnRef>
+          <a:fillRef idx="0">
+            <a:schemeClr val="accent1"/>
+          </a:fillRef>
+          <a:effectRef idx="0">
+            <a:schemeClr val="accent1"/>
+          </a:effectRef>
+          <a:fontRef idx="minor">
+            <a:schemeClr val="tx1"/>
+          </a:fontRef>
+        </p:style>
+      </p:cxnSp>
+      <p:sp>
+        <p:nvSpPr>
+          <p:cNvPr id="34" name="Rectangle 33">
+            <a:extLst>
+              <a:ext uri="{FF2B5EF4-FFF2-40B4-BE49-F238E27FC236}">
+                <a16:creationId xmlns:a16="http://schemas.microsoft.com/office/drawing/2014/main" id="{14AE202C-B860-3C3E-EF06-6E38BD25531A}"/>
+              </a:ext>
+            </a:extLst>
+          </p:cNvPr>
+          <p:cNvSpPr/>
+          <p:nvPr/>
+        </p:nvSpPr>
+        <p:spPr>
+          <a:xfrm>
+            <a:off x="357738" y="3062441"/>
+            <a:ext cx="2364600" cy="683378"/>
+          </a:xfrm>
+          <a:prstGeom prst="rect">
+            <a:avLst/>
+          </a:prstGeom>
+        </p:spPr>
+        <p:style>
+          <a:lnRef idx="2">
+            <a:schemeClr val="accent1">
+              <a:shade val="50000"/>
+            </a:schemeClr>
+          </a:lnRef>
+          <a:fillRef idx="1">
+            <a:schemeClr val="accent1"/>
+          </a:fillRef>
+          <a:effectRef idx="0">
+            <a:schemeClr val="accent1"/>
+          </a:effectRef>
+          <a:fontRef idx="minor">
+            <a:schemeClr val="lt1"/>
+          </a:fontRef>
+        </p:style>
+        <p:txBody>
+          <a:bodyPr rtlCol="0" anchor="ctr"/>
+          <a:lstStyle/>
+          <a:p>
+            <a:pPr algn="ctr"/>
+            <a:r>
+              <a:rPr lang="en-US" sz="1600" dirty="0"/>
+              <a:t>WEAR MY CLOTHES</a:t>
+            </a:r>
+          </a:p>
+        </p:txBody>
+      </p:sp>
+      <p:cxnSp>
+        <p:nvCxnSpPr>
+          <p:cNvPr id="35" name="Straight Arrow Connector 34">
+            <a:extLst>
+              <a:ext uri="{FF2B5EF4-FFF2-40B4-BE49-F238E27FC236}">
+                <a16:creationId xmlns:a16="http://schemas.microsoft.com/office/drawing/2014/main" id="{ABC0E654-1148-EAD3-4124-D91685981523}"/>
+              </a:ext>
+            </a:extLst>
+          </p:cNvPr>
+          <p:cNvCxnSpPr>
+            <a:cxnSpLocks/>
+          </p:cNvCxnSpPr>
+          <p:nvPr/>
+        </p:nvCxnSpPr>
+        <p:spPr>
+          <a:xfrm flipH="1">
+            <a:off x="2734369" y="3397719"/>
+            <a:ext cx="873497" cy="0"/>
+          </a:xfrm>
+          <a:prstGeom prst="straightConnector1">
+            <a:avLst/>
+          </a:prstGeom>
+          <a:ln>
+            <a:tailEnd type="triangle"/>
+          </a:ln>
+        </p:spPr>
+        <p:style>
+          <a:lnRef idx="1">
+            <a:schemeClr val="accent1"/>
+          </a:lnRef>
+          <a:fillRef idx="0">
+            <a:schemeClr val="accent1"/>
+          </a:fillRef>
+          <a:effectRef idx="0">
+            <a:schemeClr val="accent1"/>
+          </a:effectRef>
+          <a:fontRef idx="minor">
+            <a:schemeClr val="tx1"/>
+          </a:fontRef>
+        </p:style>
+      </p:cxnSp>
+      <p:sp>
+        <p:nvSpPr>
+          <p:cNvPr id="36" name="Rectangle 35">
+            <a:extLst>
+              <a:ext uri="{FF2B5EF4-FFF2-40B4-BE49-F238E27FC236}">
+                <a16:creationId xmlns:a16="http://schemas.microsoft.com/office/drawing/2014/main" id="{95A9C3CB-D2CD-1895-39DC-537BF09CFC34}"/>
+              </a:ext>
+            </a:extLst>
+          </p:cNvPr>
+          <p:cNvSpPr/>
+          <p:nvPr/>
+        </p:nvSpPr>
+        <p:spPr>
+          <a:xfrm>
+            <a:off x="357738" y="4560795"/>
+            <a:ext cx="2364600" cy="683378"/>
+          </a:xfrm>
+          <a:prstGeom prst="rect">
+            <a:avLst/>
+          </a:prstGeom>
+        </p:spPr>
+        <p:style>
+          <a:lnRef idx="2">
+            <a:schemeClr val="accent1">
+              <a:shade val="50000"/>
+            </a:schemeClr>
+          </a:lnRef>
+          <a:fillRef idx="1">
+            <a:schemeClr val="accent1"/>
+          </a:fillRef>
+          <a:effectRef idx="0">
+            <a:schemeClr val="accent1"/>
+          </a:effectRef>
+          <a:fontRef idx="minor">
+            <a:schemeClr val="lt1"/>
+          </a:fontRef>
+        </p:style>
+        <p:txBody>
+          <a:bodyPr rtlCol="0" anchor="ctr"/>
+          <a:lstStyle/>
+          <a:p>
+            <a:pPr algn="ctr"/>
+            <a:r>
+              <a:rPr lang="en-US" sz="1600" dirty="0"/>
+              <a:t>PUT ON MY ID CARD</a:t>
+            </a:r>
+          </a:p>
+        </p:txBody>
+      </p:sp>
+      <p:cxnSp>
+        <p:nvCxnSpPr>
+          <p:cNvPr id="37" name="Straight Arrow Connector 36">
+            <a:extLst>
+              <a:ext uri="{FF2B5EF4-FFF2-40B4-BE49-F238E27FC236}">
+                <a16:creationId xmlns:a16="http://schemas.microsoft.com/office/drawing/2014/main" id="{970FED73-5E77-D8FA-B9FF-85650A0E36D9}"/>
+              </a:ext>
+            </a:extLst>
+          </p:cNvPr>
+          <p:cNvCxnSpPr>
+            <a:cxnSpLocks/>
+            <a:endCxn id="36" idx="0"/>
+          </p:cNvCxnSpPr>
+          <p:nvPr/>
+        </p:nvCxnSpPr>
+        <p:spPr>
+          <a:xfrm>
+            <a:off x="1540013" y="3675238"/>
+            <a:ext cx="25" cy="885557"/>
+          </a:xfrm>
+          <a:prstGeom prst="straightConnector1">
+            <a:avLst/>
+          </a:prstGeom>
+          <a:ln>
+            <a:tailEnd type="triangle"/>
+          </a:ln>
+        </p:spPr>
+        <p:style>
+          <a:lnRef idx="1">
+            <a:schemeClr val="accent1"/>
+          </a:lnRef>
+          <a:fillRef idx="0">
+            <a:schemeClr val="accent1"/>
+          </a:fillRef>
+          <a:effectRef idx="0">
+            <a:schemeClr val="accent1"/>
+          </a:effectRef>
+          <a:fontRef idx="minor">
+            <a:schemeClr val="tx1"/>
+          </a:fontRef>
+        </p:style>
+      </p:cxnSp>
+      <p:sp>
+        <p:nvSpPr>
+          <p:cNvPr id="40" name="Rectangle 39">
+            <a:extLst>
+              <a:ext uri="{FF2B5EF4-FFF2-40B4-BE49-F238E27FC236}">
+                <a16:creationId xmlns:a16="http://schemas.microsoft.com/office/drawing/2014/main" id="{ED10537C-CC8C-FFDE-6F02-568576844A26}"/>
+              </a:ext>
+            </a:extLst>
+          </p:cNvPr>
+          <p:cNvSpPr/>
+          <p:nvPr/>
+        </p:nvSpPr>
+        <p:spPr>
+          <a:xfrm>
+            <a:off x="3278205" y="4560795"/>
+            <a:ext cx="2364600" cy="683378"/>
+          </a:xfrm>
+          <a:prstGeom prst="rect">
+            <a:avLst/>
+          </a:prstGeom>
+        </p:spPr>
+        <p:style>
+          <a:lnRef idx="2">
+            <a:schemeClr val="accent1">
+              <a:shade val="50000"/>
+            </a:schemeClr>
+          </a:lnRef>
+          <a:fillRef idx="1">
+            <a:schemeClr val="accent1"/>
+          </a:fillRef>
+          <a:effectRef idx="0">
+            <a:schemeClr val="accent1"/>
+          </a:effectRef>
+          <a:fontRef idx="minor">
+            <a:schemeClr val="lt1"/>
+          </a:fontRef>
+        </p:style>
+        <p:txBody>
+          <a:bodyPr rtlCol="0" anchor="ctr"/>
+          <a:lstStyle/>
+          <a:p>
+            <a:pPr algn="ctr"/>
+            <a:r>
+              <a:rPr lang="en-US" sz="1600" dirty="0"/>
+              <a:t>GO TO SCHOOL</a:t>
+            </a:r>
+          </a:p>
+        </p:txBody>
+      </p:sp>
+      <p:cxnSp>
+        <p:nvCxnSpPr>
+          <p:cNvPr id="41" name="Straight Arrow Connector 40">
+            <a:extLst>
+              <a:ext uri="{FF2B5EF4-FFF2-40B4-BE49-F238E27FC236}">
+                <a16:creationId xmlns:a16="http://schemas.microsoft.com/office/drawing/2014/main" id="{9043953F-B2BD-DBE7-5083-0BF16FAE818A}"/>
+              </a:ext>
+            </a:extLst>
+          </p:cNvPr>
+          <p:cNvCxnSpPr>
+            <a:cxnSpLocks/>
+          </p:cNvCxnSpPr>
+          <p:nvPr/>
+        </p:nvCxnSpPr>
+        <p:spPr>
+          <a:xfrm>
+            <a:off x="2533033" y="4931347"/>
+            <a:ext cx="747556" cy="1603"/>
           </a:xfrm>
           <a:prstGeom prst="straightConnector1">
             <a:avLst/>
@@ -4407,7 +5432,7 @@
     </p:spTree>
     <p:extLst>
       <p:ext uri="{BB962C8B-B14F-4D97-AF65-F5344CB8AC3E}">
-        <p14:creationId xmlns:p14="http://schemas.microsoft.com/office/powerpoint/2010/main" val="1867408643"/>
+        <p14:creationId xmlns:p14="http://schemas.microsoft.com/office/powerpoint/2010/main" val="2008177831"/>
       </p:ext>
     </p:extLst>
   </p:cSld>

</xml_diff>

<commit_message>
(My week 3 commit)\
</commit_message>
<xml_diff>
--- a/Week_3/Presentation1.pptx
+++ b/Week_3/Presentation1.pptx
@@ -7,6 +7,7 @@
   <p:sldIdLst>
     <p:sldId id="258" r:id="rId2"/>
     <p:sldId id="259" r:id="rId3"/>
+    <p:sldId id="260" r:id="rId4"/>
   </p:sldIdLst>
   <p:sldSz cx="12192000" cy="6858000"/>
   <p:notesSz cx="6858000" cy="9144000"/>
@@ -3512,10 +3513,10 @@
       </p:sp>
       <p:sp>
         <p:nvSpPr>
-          <p:cNvPr id="6" name="Parallelogram 5">
-            <a:extLst>
-              <a:ext uri="{FF2B5EF4-FFF2-40B4-BE49-F238E27FC236}">
-                <a16:creationId xmlns:a16="http://schemas.microsoft.com/office/drawing/2014/main" id="{9BEB3775-641D-137E-D8A3-7DE4F4CA93DB}"/>
+          <p:cNvPr id="7" name="Rectangle 6">
+            <a:extLst>
+              <a:ext uri="{FF2B5EF4-FFF2-40B4-BE49-F238E27FC236}">
+                <a16:creationId xmlns:a16="http://schemas.microsoft.com/office/drawing/2014/main" id="{939B3300-0972-35A6-F7C8-40B265BB549D}"/>
               </a:ext>
             </a:extLst>
           </p:cNvPr>
@@ -3524,10 +3525,10 @@
         </p:nvSpPr>
         <p:spPr>
           <a:xfrm>
-            <a:off x="6054289" y="847817"/>
-            <a:ext cx="2261937" cy="693019"/>
-          </a:xfrm>
-          <a:prstGeom prst="parallelogram">
+            <a:off x="9374211" y="2077283"/>
+            <a:ext cx="2358981" cy="693019"/>
+          </a:xfrm>
+          <a:prstGeom prst="rect">
             <a:avLst/>
           </a:prstGeom>
         </p:spPr>
@@ -3554,17 +3555,17 @@
             <a:pPr algn="ctr"/>
             <a:r>
               <a:rPr lang="en-US" dirty="0"/>
-              <a:t>SEE PRICES OF ITEMS TO BUY</a:t>
-            </a:r>
-          </a:p>
-        </p:txBody>
-      </p:sp>
-      <p:sp>
-        <p:nvSpPr>
-          <p:cNvPr id="7" name="Rectangle 6">
-            <a:extLst>
-              <a:ext uri="{FF2B5EF4-FFF2-40B4-BE49-F238E27FC236}">
-                <a16:creationId xmlns:a16="http://schemas.microsoft.com/office/drawing/2014/main" id="{939B3300-0972-35A6-F7C8-40B265BB549D}"/>
+              <a:t>EDIT FILLED CART</a:t>
+            </a:r>
+          </a:p>
+        </p:txBody>
+      </p:sp>
+      <p:sp>
+        <p:nvSpPr>
+          <p:cNvPr id="8" name="Diamond 7">
+            <a:extLst>
+              <a:ext uri="{FF2B5EF4-FFF2-40B4-BE49-F238E27FC236}">
+                <a16:creationId xmlns:a16="http://schemas.microsoft.com/office/drawing/2014/main" id="{F4872C08-CBF8-D5C3-9C99-3B30BD549D1F}"/>
               </a:ext>
             </a:extLst>
           </p:cNvPr>
@@ -3573,10 +3574,10 @@
         </p:nvSpPr>
         <p:spPr>
           <a:xfrm>
-            <a:off x="9374211" y="2077283"/>
-            <a:ext cx="2358981" cy="693019"/>
-          </a:xfrm>
-          <a:prstGeom prst="rect">
+            <a:off x="5980495" y="1920240"/>
+            <a:ext cx="2608446" cy="1313848"/>
+          </a:xfrm>
+          <a:prstGeom prst="diamond">
             <a:avLst/>
           </a:prstGeom>
         </p:spPr>
@@ -3603,55 +3604,6 @@
             <a:pPr algn="ctr"/>
             <a:r>
               <a:rPr lang="en-US" dirty="0"/>
-              <a:t>EDIT FILLED CART</a:t>
-            </a:r>
-          </a:p>
-        </p:txBody>
-      </p:sp>
-      <p:sp>
-        <p:nvSpPr>
-          <p:cNvPr id="8" name="Diamond 7">
-            <a:extLst>
-              <a:ext uri="{FF2B5EF4-FFF2-40B4-BE49-F238E27FC236}">
-                <a16:creationId xmlns:a16="http://schemas.microsoft.com/office/drawing/2014/main" id="{F4872C08-CBF8-D5C3-9C99-3B30BD549D1F}"/>
-              </a:ext>
-            </a:extLst>
-          </p:cNvPr>
-          <p:cNvSpPr/>
-          <p:nvPr/>
-        </p:nvSpPr>
-        <p:spPr>
-          <a:xfrm>
-            <a:off x="5980495" y="1920240"/>
-            <a:ext cx="2608446" cy="1313848"/>
-          </a:xfrm>
-          <a:prstGeom prst="diamond">
-            <a:avLst/>
-          </a:prstGeom>
-        </p:spPr>
-        <p:style>
-          <a:lnRef idx="2">
-            <a:schemeClr val="accent1">
-              <a:shade val="50000"/>
-            </a:schemeClr>
-          </a:lnRef>
-          <a:fillRef idx="1">
-            <a:schemeClr val="accent1"/>
-          </a:fillRef>
-          <a:effectRef idx="0">
-            <a:schemeClr val="accent1"/>
-          </a:effectRef>
-          <a:fontRef idx="minor">
-            <a:schemeClr val="lt1"/>
-          </a:fontRef>
-        </p:style>
-        <p:txBody>
-          <a:bodyPr rtlCol="0" anchor="ctr"/>
-          <a:lstStyle/>
-          <a:p>
-            <a:pPr algn="ctr"/>
-            <a:r>
-              <a:rPr lang="en-US" dirty="0"/>
               <a:t>CONFIRM CONTENTS. CHECKOUT?</a:t>
             </a:r>
           </a:p>
@@ -3666,13 +3618,15 @@
               </a:ext>
             </a:extLst>
           </p:cNvPr>
-          <p:cNvCxnSpPr/>
+          <p:cNvCxnSpPr>
+            <a:cxnSpLocks/>
+          </p:cNvCxnSpPr>
           <p:nvPr/>
         </p:nvCxnSpPr>
         <p:spPr>
           <a:xfrm flipV="1">
-            <a:off x="10693667" y="2906828"/>
-            <a:ext cx="0" cy="914400"/>
+            <a:off x="10693667" y="2791328"/>
+            <a:ext cx="0" cy="1045949"/>
           </a:xfrm>
           <a:prstGeom prst="straightConnector1">
             <a:avLst/>
@@ -3966,13 +3920,14 @@
           </p:cNvPr>
           <p:cNvCxnSpPr>
             <a:cxnSpLocks/>
+            <a:endCxn id="4" idx="1"/>
           </p:cNvCxnSpPr>
           <p:nvPr/>
         </p:nvCxnSpPr>
         <p:spPr>
-          <a:xfrm flipV="1">
-            <a:off x="2130408" y="1152979"/>
-            <a:ext cx="911191" cy="2"/>
+          <a:xfrm>
+            <a:off x="2130408" y="1152981"/>
+            <a:ext cx="988177" cy="11675"/>
           </a:xfrm>
           <a:prstGeom prst="straightConnector1">
             <a:avLst/>
@@ -4012,8 +3967,8 @@
         </p:nvCxnSpPr>
         <p:spPr>
           <a:xfrm>
-            <a:off x="4559170" y="1191926"/>
-            <a:ext cx="1368393" cy="0"/>
+            <a:off x="4684295" y="1191926"/>
+            <a:ext cx="1456621" cy="2401"/>
           </a:xfrm>
           <a:prstGeom prst="straightConnector1">
             <a:avLst/>
@@ -4053,8 +4008,8 @@
         </p:nvCxnSpPr>
         <p:spPr>
           <a:xfrm>
-            <a:off x="7889524" y="1191927"/>
-            <a:ext cx="1368393" cy="0"/>
+            <a:off x="7956900" y="1191927"/>
+            <a:ext cx="1369979" cy="0"/>
           </a:xfrm>
           <a:prstGeom prst="straightConnector1">
             <a:avLst/>
@@ -4094,7 +4049,7 @@
         </p:nvCxnSpPr>
         <p:spPr>
           <a:xfrm>
-            <a:off x="10672828" y="1345928"/>
+            <a:off x="10672828" y="1403678"/>
             <a:ext cx="0" cy="664144"/>
           </a:xfrm>
           <a:prstGeom prst="straightConnector1">
@@ -4424,8 +4379,8 @@
         </p:nvCxnSpPr>
         <p:spPr>
           <a:xfrm>
-            <a:off x="4966637" y="4299286"/>
-            <a:ext cx="1634683" cy="0"/>
+            <a:off x="4899257" y="4299286"/>
+            <a:ext cx="1759813" cy="0"/>
           </a:xfrm>
           <a:prstGeom prst="straightConnector1">
             <a:avLst/>
@@ -4494,6 +4449,55 @@
             <a:r>
               <a:rPr lang="en-US" dirty="0"/>
               <a:t>CONFIRM ORDER</a:t>
+            </a:r>
+          </a:p>
+        </p:txBody>
+      </p:sp>
+      <p:sp>
+        <p:nvSpPr>
+          <p:cNvPr id="21" name="Rectangle 20">
+            <a:extLst>
+              <a:ext uri="{FF2B5EF4-FFF2-40B4-BE49-F238E27FC236}">
+                <a16:creationId xmlns:a16="http://schemas.microsoft.com/office/drawing/2014/main" id="{1ADFE51F-F31F-6142-E859-69896D256817}"/>
+              </a:ext>
+            </a:extLst>
+          </p:cNvPr>
+          <p:cNvSpPr/>
+          <p:nvPr/>
+        </p:nvSpPr>
+        <p:spPr>
+          <a:xfrm>
+            <a:off x="6158553" y="739210"/>
+            <a:ext cx="2387065" cy="789603"/>
+          </a:xfrm>
+          <a:prstGeom prst="rect">
+            <a:avLst/>
+          </a:prstGeom>
+        </p:spPr>
+        <p:style>
+          <a:lnRef idx="2">
+            <a:schemeClr val="accent1">
+              <a:shade val="50000"/>
+            </a:schemeClr>
+          </a:lnRef>
+          <a:fillRef idx="1">
+            <a:schemeClr val="accent1"/>
+          </a:fillRef>
+          <a:effectRef idx="0">
+            <a:schemeClr val="accent1"/>
+          </a:effectRef>
+          <a:fontRef idx="minor">
+            <a:schemeClr val="lt1"/>
+          </a:fontRef>
+        </p:style>
+        <p:txBody>
+          <a:bodyPr rtlCol="0" anchor="ctr"/>
+          <a:lstStyle/>
+          <a:p>
+            <a:pPr algn="ctr"/>
+            <a:r>
+              <a:rPr lang="en-US" dirty="0"/>
+              <a:t>SEE PRICES OF ITEMS TO BUY</a:t>
             </a:r>
           </a:p>
         </p:txBody>
@@ -5433,6 +5437,978 @@
     <p:extLst>
       <p:ext uri="{BB962C8B-B14F-4D97-AF65-F5344CB8AC3E}">
         <p14:creationId xmlns:p14="http://schemas.microsoft.com/office/powerpoint/2010/main" val="2008177831"/>
+      </p:ext>
+    </p:extLst>
+  </p:cSld>
+  <p:clrMapOvr>
+    <a:masterClrMapping/>
+  </p:clrMapOvr>
+</p:sld>
+</file>
+
+<file path=ppt/slides/slide3.xml><?xml version="1.0" encoding="utf-8"?>
+<p:sld xmlns:a="http://schemas.openxmlformats.org/drawingml/2006/main" xmlns:r="http://schemas.openxmlformats.org/officeDocument/2006/relationships" xmlns:p="http://schemas.openxmlformats.org/presentationml/2006/main">
+  <p:cSld>
+    <p:spTree>
+      <p:nvGrpSpPr>
+        <p:cNvPr id="1" name=""/>
+        <p:cNvGrpSpPr/>
+        <p:nvPr/>
+      </p:nvGrpSpPr>
+      <p:grpSpPr>
+        <a:xfrm>
+          <a:off x="0" y="0"/>
+          <a:ext cx="0" cy="0"/>
+          <a:chOff x="0" y="0"/>
+          <a:chExt cx="0" cy="0"/>
+        </a:xfrm>
+      </p:grpSpPr>
+      <p:sp>
+        <p:nvSpPr>
+          <p:cNvPr id="2" name="Oval 1">
+            <a:extLst>
+              <a:ext uri="{FF2B5EF4-FFF2-40B4-BE49-F238E27FC236}">
+                <a16:creationId xmlns:a16="http://schemas.microsoft.com/office/drawing/2014/main" id="{FA2138C2-CF9D-A6D0-0B46-FFEE16FF8CBE}"/>
+              </a:ext>
+            </a:extLst>
+          </p:cNvPr>
+          <p:cNvSpPr/>
+          <p:nvPr/>
+        </p:nvSpPr>
+        <p:spPr>
+          <a:xfrm>
+            <a:off x="1230439" y="1568720"/>
+            <a:ext cx="1206367" cy="904775"/>
+          </a:xfrm>
+          <a:prstGeom prst="ellipse">
+            <a:avLst/>
+          </a:prstGeom>
+        </p:spPr>
+        <p:style>
+          <a:lnRef idx="2">
+            <a:schemeClr val="accent1">
+              <a:shade val="50000"/>
+            </a:schemeClr>
+          </a:lnRef>
+          <a:fillRef idx="1">
+            <a:schemeClr val="accent1"/>
+          </a:fillRef>
+          <a:effectRef idx="0">
+            <a:schemeClr val="accent1"/>
+          </a:effectRef>
+          <a:fontRef idx="minor">
+            <a:schemeClr val="lt1"/>
+          </a:fontRef>
+        </p:style>
+        <p:txBody>
+          <a:bodyPr rtlCol="0" anchor="ctr"/>
+          <a:lstStyle/>
+          <a:p>
+            <a:pPr algn="ctr"/>
+            <a:r>
+              <a:rPr lang="en-US" dirty="0"/>
+              <a:t>START</a:t>
+            </a:r>
+          </a:p>
+        </p:txBody>
+      </p:sp>
+      <p:sp>
+        <p:nvSpPr>
+          <p:cNvPr id="3" name="Rectangle 2">
+            <a:extLst>
+              <a:ext uri="{FF2B5EF4-FFF2-40B4-BE49-F238E27FC236}">
+                <a16:creationId xmlns:a16="http://schemas.microsoft.com/office/drawing/2014/main" id="{7922852D-1836-C318-304D-FFA80E5323FD}"/>
+              </a:ext>
+            </a:extLst>
+          </p:cNvPr>
+          <p:cNvSpPr/>
+          <p:nvPr/>
+        </p:nvSpPr>
+        <p:spPr>
+          <a:xfrm>
+            <a:off x="3243711" y="1679417"/>
+            <a:ext cx="2128789" cy="683380"/>
+          </a:xfrm>
+          <a:prstGeom prst="rect">
+            <a:avLst/>
+          </a:prstGeom>
+        </p:spPr>
+        <p:style>
+          <a:lnRef idx="2">
+            <a:schemeClr val="accent1">
+              <a:shade val="50000"/>
+            </a:schemeClr>
+          </a:lnRef>
+          <a:fillRef idx="1">
+            <a:schemeClr val="accent1"/>
+          </a:fillRef>
+          <a:effectRef idx="0">
+            <a:schemeClr val="accent1"/>
+          </a:effectRef>
+          <a:fontRef idx="minor">
+            <a:schemeClr val="lt1"/>
+          </a:fontRef>
+        </p:style>
+        <p:txBody>
+          <a:bodyPr rtlCol="0" anchor="ctr"/>
+          <a:lstStyle/>
+          <a:p>
+            <a:pPr algn="ctr"/>
+            <a:r>
+              <a:rPr lang="en-US" dirty="0"/>
+              <a:t>ENTER NAME1 AND AGE1</a:t>
+            </a:r>
+          </a:p>
+        </p:txBody>
+      </p:sp>
+      <p:sp>
+        <p:nvSpPr>
+          <p:cNvPr id="4" name="Parallelogram 3">
+            <a:extLst>
+              <a:ext uri="{FF2B5EF4-FFF2-40B4-BE49-F238E27FC236}">
+                <a16:creationId xmlns:a16="http://schemas.microsoft.com/office/drawing/2014/main" id="{B4A84E3B-8135-16FD-C582-03F4FDD97803}"/>
+              </a:ext>
+            </a:extLst>
+          </p:cNvPr>
+          <p:cNvSpPr/>
+          <p:nvPr/>
+        </p:nvSpPr>
+        <p:spPr>
+          <a:xfrm>
+            <a:off x="6073541" y="1679417"/>
+            <a:ext cx="2261937" cy="693019"/>
+          </a:xfrm>
+          <a:prstGeom prst="parallelogram">
+            <a:avLst/>
+          </a:prstGeom>
+        </p:spPr>
+        <p:style>
+          <a:lnRef idx="2">
+            <a:schemeClr val="accent1">
+              <a:shade val="50000"/>
+            </a:schemeClr>
+          </a:lnRef>
+          <a:fillRef idx="1">
+            <a:schemeClr val="accent1"/>
+          </a:fillRef>
+          <a:effectRef idx="0">
+            <a:schemeClr val="accent1"/>
+          </a:effectRef>
+          <a:fontRef idx="minor">
+            <a:schemeClr val="lt1"/>
+          </a:fontRef>
+        </p:style>
+        <p:txBody>
+          <a:bodyPr rtlCol="0" anchor="ctr"/>
+          <a:lstStyle/>
+          <a:p>
+            <a:pPr algn="ctr"/>
+            <a:r>
+              <a:rPr lang="en-US" dirty="0"/>
+              <a:t>READ NAME1 AND AGE1</a:t>
+            </a:r>
+          </a:p>
+        </p:txBody>
+      </p:sp>
+      <p:sp>
+        <p:nvSpPr>
+          <p:cNvPr id="5" name="Rectangle 4">
+            <a:extLst>
+              <a:ext uri="{FF2B5EF4-FFF2-40B4-BE49-F238E27FC236}">
+                <a16:creationId xmlns:a16="http://schemas.microsoft.com/office/drawing/2014/main" id="{350AD9E0-A085-8B4A-F9F5-4F49C461310A}"/>
+              </a:ext>
+            </a:extLst>
+          </p:cNvPr>
+          <p:cNvSpPr/>
+          <p:nvPr/>
+        </p:nvSpPr>
+        <p:spPr>
+          <a:xfrm>
+            <a:off x="9132781" y="1687440"/>
+            <a:ext cx="2128789" cy="683380"/>
+          </a:xfrm>
+          <a:prstGeom prst="rect">
+            <a:avLst/>
+          </a:prstGeom>
+        </p:spPr>
+        <p:style>
+          <a:lnRef idx="2">
+            <a:schemeClr val="accent1">
+              <a:shade val="50000"/>
+            </a:schemeClr>
+          </a:lnRef>
+          <a:fillRef idx="1">
+            <a:schemeClr val="accent1"/>
+          </a:fillRef>
+          <a:effectRef idx="0">
+            <a:schemeClr val="accent1"/>
+          </a:effectRef>
+          <a:fontRef idx="minor">
+            <a:schemeClr val="lt1"/>
+          </a:fontRef>
+        </p:style>
+        <p:txBody>
+          <a:bodyPr rtlCol="0" anchor="ctr"/>
+          <a:lstStyle/>
+          <a:p>
+            <a:pPr algn="ctr"/>
+            <a:r>
+              <a:rPr lang="en-US" dirty="0"/>
+              <a:t>ENTER NAME2 AND AGE2</a:t>
+            </a:r>
+          </a:p>
+        </p:txBody>
+      </p:sp>
+      <p:sp>
+        <p:nvSpPr>
+          <p:cNvPr id="6" name="Parallelogram 5">
+            <a:extLst>
+              <a:ext uri="{FF2B5EF4-FFF2-40B4-BE49-F238E27FC236}">
+                <a16:creationId xmlns:a16="http://schemas.microsoft.com/office/drawing/2014/main" id="{093CC7CA-FB3A-D519-41B8-ABDA4A6D35CD}"/>
+              </a:ext>
+            </a:extLst>
+          </p:cNvPr>
+          <p:cNvSpPr/>
+          <p:nvPr/>
+        </p:nvSpPr>
+        <p:spPr>
+          <a:xfrm>
+            <a:off x="9161650" y="3208231"/>
+            <a:ext cx="2261937" cy="693019"/>
+          </a:xfrm>
+          <a:prstGeom prst="parallelogram">
+            <a:avLst/>
+          </a:prstGeom>
+        </p:spPr>
+        <p:style>
+          <a:lnRef idx="2">
+            <a:schemeClr val="accent1">
+              <a:shade val="50000"/>
+            </a:schemeClr>
+          </a:lnRef>
+          <a:fillRef idx="1">
+            <a:schemeClr val="accent1"/>
+          </a:fillRef>
+          <a:effectRef idx="0">
+            <a:schemeClr val="accent1"/>
+          </a:effectRef>
+          <a:fontRef idx="minor">
+            <a:schemeClr val="lt1"/>
+          </a:fontRef>
+        </p:style>
+        <p:txBody>
+          <a:bodyPr rtlCol="0" anchor="ctr"/>
+          <a:lstStyle/>
+          <a:p>
+            <a:pPr algn="ctr"/>
+            <a:r>
+              <a:rPr lang="en-US" dirty="0"/>
+              <a:t>READ NAME2 AND AGE2</a:t>
+            </a:r>
+          </a:p>
+        </p:txBody>
+      </p:sp>
+      <p:sp>
+        <p:nvSpPr>
+          <p:cNvPr id="7" name="Rectangle 6">
+            <a:extLst>
+              <a:ext uri="{FF2B5EF4-FFF2-40B4-BE49-F238E27FC236}">
+                <a16:creationId xmlns:a16="http://schemas.microsoft.com/office/drawing/2014/main" id="{74B1BC01-99C8-6F6E-5902-811D3159384F}"/>
+              </a:ext>
+            </a:extLst>
+          </p:cNvPr>
+          <p:cNvSpPr/>
+          <p:nvPr/>
+        </p:nvSpPr>
+        <p:spPr>
+          <a:xfrm>
+            <a:off x="6140114" y="3208231"/>
+            <a:ext cx="2128789" cy="683380"/>
+          </a:xfrm>
+          <a:prstGeom prst="rect">
+            <a:avLst/>
+          </a:prstGeom>
+        </p:spPr>
+        <p:style>
+          <a:lnRef idx="2">
+            <a:schemeClr val="accent1">
+              <a:shade val="50000"/>
+            </a:schemeClr>
+          </a:lnRef>
+          <a:fillRef idx="1">
+            <a:schemeClr val="accent1"/>
+          </a:fillRef>
+          <a:effectRef idx="0">
+            <a:schemeClr val="accent1"/>
+          </a:effectRef>
+          <a:fontRef idx="minor">
+            <a:schemeClr val="lt1"/>
+          </a:fontRef>
+        </p:style>
+        <p:txBody>
+          <a:bodyPr rtlCol="0" anchor="ctr"/>
+          <a:lstStyle/>
+          <a:p>
+            <a:pPr algn="ctr"/>
+            <a:r>
+              <a:rPr lang="en-US" dirty="0"/>
+              <a:t>A = (“{} IS {} YRS OLD”, NAME1,AGE2)</a:t>
+            </a:r>
+          </a:p>
+        </p:txBody>
+      </p:sp>
+      <p:sp>
+        <p:nvSpPr>
+          <p:cNvPr id="8" name="Rectangle 7">
+            <a:extLst>
+              <a:ext uri="{FF2B5EF4-FFF2-40B4-BE49-F238E27FC236}">
+                <a16:creationId xmlns:a16="http://schemas.microsoft.com/office/drawing/2014/main" id="{C86DA30C-DE5E-8135-6DDB-3B9938481F42}"/>
+              </a:ext>
+            </a:extLst>
+          </p:cNvPr>
+          <p:cNvSpPr/>
+          <p:nvPr/>
+        </p:nvSpPr>
+        <p:spPr>
+          <a:xfrm>
+            <a:off x="3270174" y="3216253"/>
+            <a:ext cx="2128789" cy="683380"/>
+          </a:xfrm>
+          <a:prstGeom prst="rect">
+            <a:avLst/>
+          </a:prstGeom>
+        </p:spPr>
+        <p:style>
+          <a:lnRef idx="2">
+            <a:schemeClr val="accent1">
+              <a:shade val="50000"/>
+            </a:schemeClr>
+          </a:lnRef>
+          <a:fillRef idx="1">
+            <a:schemeClr val="accent1"/>
+          </a:fillRef>
+          <a:effectRef idx="0">
+            <a:schemeClr val="accent1"/>
+          </a:effectRef>
+          <a:fontRef idx="minor">
+            <a:schemeClr val="lt1"/>
+          </a:fontRef>
+        </p:style>
+        <p:txBody>
+          <a:bodyPr rtlCol="0" anchor="ctr"/>
+          <a:lstStyle/>
+          <a:p>
+            <a:pPr algn="ctr"/>
+            <a:r>
+              <a:rPr lang="en-US" dirty="0"/>
+              <a:t>B = (“{} IS {} YRS OLD”, NAME2,AGE1)</a:t>
+            </a:r>
+          </a:p>
+        </p:txBody>
+      </p:sp>
+      <p:sp>
+        <p:nvSpPr>
+          <p:cNvPr id="10" name="Parallelogram 9">
+            <a:extLst>
+              <a:ext uri="{FF2B5EF4-FFF2-40B4-BE49-F238E27FC236}">
+                <a16:creationId xmlns:a16="http://schemas.microsoft.com/office/drawing/2014/main" id="{641AE114-95C5-2093-92CD-F36526584C79}"/>
+              </a:ext>
+            </a:extLst>
+          </p:cNvPr>
+          <p:cNvSpPr/>
+          <p:nvPr/>
+        </p:nvSpPr>
+        <p:spPr>
+          <a:xfrm>
+            <a:off x="689796" y="3216252"/>
+            <a:ext cx="2261937" cy="693019"/>
+          </a:xfrm>
+          <a:prstGeom prst="parallelogram">
+            <a:avLst/>
+          </a:prstGeom>
+        </p:spPr>
+        <p:style>
+          <a:lnRef idx="2">
+            <a:schemeClr val="accent1">
+              <a:shade val="50000"/>
+            </a:schemeClr>
+          </a:lnRef>
+          <a:fillRef idx="1">
+            <a:schemeClr val="accent1"/>
+          </a:fillRef>
+          <a:effectRef idx="0">
+            <a:schemeClr val="accent1"/>
+          </a:effectRef>
+          <a:fontRef idx="minor">
+            <a:schemeClr val="lt1"/>
+          </a:fontRef>
+        </p:style>
+        <p:txBody>
+          <a:bodyPr rtlCol="0" anchor="ctr"/>
+          <a:lstStyle/>
+          <a:p>
+            <a:pPr algn="ctr"/>
+            <a:r>
+              <a:rPr lang="en-US" dirty="0"/>
+              <a:t>PRINT A</a:t>
+            </a:r>
+          </a:p>
+        </p:txBody>
+      </p:sp>
+      <p:sp>
+        <p:nvSpPr>
+          <p:cNvPr id="11" name="Parallelogram 10">
+            <a:extLst>
+              <a:ext uri="{FF2B5EF4-FFF2-40B4-BE49-F238E27FC236}">
+                <a16:creationId xmlns:a16="http://schemas.microsoft.com/office/drawing/2014/main" id="{3D5615B9-6BCC-8F64-E677-08543E27BCBB}"/>
+              </a:ext>
+            </a:extLst>
+          </p:cNvPr>
+          <p:cNvSpPr/>
+          <p:nvPr/>
+        </p:nvSpPr>
+        <p:spPr>
+          <a:xfrm>
+            <a:off x="678569" y="4552561"/>
+            <a:ext cx="2261937" cy="693019"/>
+          </a:xfrm>
+          <a:prstGeom prst="parallelogram">
+            <a:avLst/>
+          </a:prstGeom>
+        </p:spPr>
+        <p:style>
+          <a:lnRef idx="2">
+            <a:schemeClr val="accent1">
+              <a:shade val="50000"/>
+            </a:schemeClr>
+          </a:lnRef>
+          <a:fillRef idx="1">
+            <a:schemeClr val="accent1"/>
+          </a:fillRef>
+          <a:effectRef idx="0">
+            <a:schemeClr val="accent1"/>
+          </a:effectRef>
+          <a:fontRef idx="minor">
+            <a:schemeClr val="lt1"/>
+          </a:fontRef>
+        </p:style>
+        <p:txBody>
+          <a:bodyPr rtlCol="0" anchor="ctr"/>
+          <a:lstStyle/>
+          <a:p>
+            <a:pPr algn="ctr"/>
+            <a:r>
+              <a:rPr lang="en-US" dirty="0"/>
+              <a:t>PRINT B</a:t>
+            </a:r>
+          </a:p>
+        </p:txBody>
+      </p:sp>
+      <p:sp>
+        <p:nvSpPr>
+          <p:cNvPr id="12" name="Oval 11">
+            <a:extLst>
+              <a:ext uri="{FF2B5EF4-FFF2-40B4-BE49-F238E27FC236}">
+                <a16:creationId xmlns:a16="http://schemas.microsoft.com/office/drawing/2014/main" id="{7A21A763-2A24-AFD2-5A24-12667858D9B6}"/>
+              </a:ext>
+            </a:extLst>
+          </p:cNvPr>
+          <p:cNvSpPr/>
+          <p:nvPr/>
+        </p:nvSpPr>
+        <p:spPr>
+          <a:xfrm>
+            <a:off x="3827662" y="4435452"/>
+            <a:ext cx="1206367" cy="904775"/>
+          </a:xfrm>
+          <a:prstGeom prst="ellipse">
+            <a:avLst/>
+          </a:prstGeom>
+        </p:spPr>
+        <p:style>
+          <a:lnRef idx="2">
+            <a:schemeClr val="accent1">
+              <a:shade val="50000"/>
+            </a:schemeClr>
+          </a:lnRef>
+          <a:fillRef idx="1">
+            <a:schemeClr val="accent1"/>
+          </a:fillRef>
+          <a:effectRef idx="0">
+            <a:schemeClr val="accent1"/>
+          </a:effectRef>
+          <a:fontRef idx="minor">
+            <a:schemeClr val="lt1"/>
+          </a:fontRef>
+        </p:style>
+        <p:txBody>
+          <a:bodyPr rtlCol="0" anchor="ctr"/>
+          <a:lstStyle/>
+          <a:p>
+            <a:pPr algn="ctr"/>
+            <a:r>
+              <a:rPr lang="en-US" dirty="0"/>
+              <a:t>END</a:t>
+            </a:r>
+          </a:p>
+        </p:txBody>
+      </p:sp>
+      <p:cxnSp>
+        <p:nvCxnSpPr>
+          <p:cNvPr id="14" name="Straight Arrow Connector 13">
+            <a:extLst>
+              <a:ext uri="{FF2B5EF4-FFF2-40B4-BE49-F238E27FC236}">
+                <a16:creationId xmlns:a16="http://schemas.microsoft.com/office/drawing/2014/main" id="{0BFAFCCD-F78A-9D4D-FEF7-F1A13B7E65C4}"/>
+              </a:ext>
+            </a:extLst>
+          </p:cNvPr>
+          <p:cNvCxnSpPr>
+            <a:stCxn id="2" idx="6"/>
+            <a:endCxn id="3" idx="1"/>
+          </p:cNvCxnSpPr>
+          <p:nvPr/>
+        </p:nvCxnSpPr>
+        <p:spPr>
+          <a:xfrm flipV="1">
+            <a:off x="2436806" y="2021107"/>
+            <a:ext cx="806905" cy="1"/>
+          </a:xfrm>
+          <a:prstGeom prst="straightConnector1">
+            <a:avLst/>
+          </a:prstGeom>
+          <a:ln>
+            <a:tailEnd type="triangle"/>
+          </a:ln>
+        </p:spPr>
+        <p:style>
+          <a:lnRef idx="1">
+            <a:schemeClr val="accent1"/>
+          </a:lnRef>
+          <a:fillRef idx="0">
+            <a:schemeClr val="accent1"/>
+          </a:fillRef>
+          <a:effectRef idx="0">
+            <a:schemeClr val="accent1"/>
+          </a:effectRef>
+          <a:fontRef idx="minor">
+            <a:schemeClr val="tx1"/>
+          </a:fontRef>
+        </p:style>
+      </p:cxnSp>
+      <p:cxnSp>
+        <p:nvCxnSpPr>
+          <p:cNvPr id="15" name="Straight Arrow Connector 14">
+            <a:extLst>
+              <a:ext uri="{FF2B5EF4-FFF2-40B4-BE49-F238E27FC236}">
+                <a16:creationId xmlns:a16="http://schemas.microsoft.com/office/drawing/2014/main" id="{B70532C8-AF81-1B2D-2C8C-D7F12BC11B80}"/>
+              </a:ext>
+            </a:extLst>
+          </p:cNvPr>
+          <p:cNvCxnSpPr/>
+          <p:nvPr/>
+        </p:nvCxnSpPr>
+        <p:spPr>
+          <a:xfrm flipV="1">
+            <a:off x="5351658" y="1990626"/>
+            <a:ext cx="806905" cy="1"/>
+          </a:xfrm>
+          <a:prstGeom prst="straightConnector1">
+            <a:avLst/>
+          </a:prstGeom>
+          <a:ln>
+            <a:tailEnd type="triangle"/>
+          </a:ln>
+        </p:spPr>
+        <p:style>
+          <a:lnRef idx="1">
+            <a:schemeClr val="accent1"/>
+          </a:lnRef>
+          <a:fillRef idx="0">
+            <a:schemeClr val="accent1"/>
+          </a:fillRef>
+          <a:effectRef idx="0">
+            <a:schemeClr val="accent1"/>
+          </a:effectRef>
+          <a:fontRef idx="minor">
+            <a:schemeClr val="tx1"/>
+          </a:fontRef>
+        </p:style>
+      </p:cxnSp>
+      <p:cxnSp>
+        <p:nvCxnSpPr>
+          <p:cNvPr id="16" name="Straight Arrow Connector 15">
+            <a:extLst>
+              <a:ext uri="{FF2B5EF4-FFF2-40B4-BE49-F238E27FC236}">
+                <a16:creationId xmlns:a16="http://schemas.microsoft.com/office/drawing/2014/main" id="{525C3C5A-2236-E706-A025-8DB1CB845662}"/>
+              </a:ext>
+            </a:extLst>
+          </p:cNvPr>
+          <p:cNvCxnSpPr>
+            <a:cxnSpLocks/>
+          </p:cNvCxnSpPr>
+          <p:nvPr/>
+        </p:nvCxnSpPr>
+        <p:spPr>
+          <a:xfrm>
+            <a:off x="8046721" y="2046774"/>
+            <a:ext cx="1074833" cy="0"/>
+          </a:xfrm>
+          <a:prstGeom prst="straightConnector1">
+            <a:avLst/>
+          </a:prstGeom>
+          <a:ln>
+            <a:tailEnd type="triangle"/>
+          </a:ln>
+        </p:spPr>
+        <p:style>
+          <a:lnRef idx="1">
+            <a:schemeClr val="accent1"/>
+          </a:lnRef>
+          <a:fillRef idx="0">
+            <a:schemeClr val="accent1"/>
+          </a:fillRef>
+          <a:effectRef idx="0">
+            <a:schemeClr val="accent1"/>
+          </a:effectRef>
+          <a:fontRef idx="minor">
+            <a:schemeClr val="tx1"/>
+          </a:fontRef>
+        </p:style>
+      </p:cxnSp>
+      <p:cxnSp>
+        <p:nvCxnSpPr>
+          <p:cNvPr id="17" name="Straight Arrow Connector 16">
+            <a:extLst>
+              <a:ext uri="{FF2B5EF4-FFF2-40B4-BE49-F238E27FC236}">
+                <a16:creationId xmlns:a16="http://schemas.microsoft.com/office/drawing/2014/main" id="{EEAC2601-8D3F-1A06-2985-104D877B745F}"/>
+              </a:ext>
+            </a:extLst>
+          </p:cNvPr>
+          <p:cNvCxnSpPr>
+            <a:cxnSpLocks/>
+          </p:cNvCxnSpPr>
+          <p:nvPr/>
+        </p:nvCxnSpPr>
+        <p:spPr>
+          <a:xfrm>
+            <a:off x="10213226" y="1935898"/>
+            <a:ext cx="0" cy="1272333"/>
+          </a:xfrm>
+          <a:prstGeom prst="straightConnector1">
+            <a:avLst/>
+          </a:prstGeom>
+          <a:ln>
+            <a:tailEnd type="triangle"/>
+          </a:ln>
+        </p:spPr>
+        <p:style>
+          <a:lnRef idx="1">
+            <a:schemeClr val="accent1"/>
+          </a:lnRef>
+          <a:fillRef idx="0">
+            <a:schemeClr val="accent1"/>
+          </a:fillRef>
+          <a:effectRef idx="0">
+            <a:schemeClr val="accent1"/>
+          </a:effectRef>
+          <a:fontRef idx="minor">
+            <a:schemeClr val="tx1"/>
+          </a:fontRef>
+        </p:style>
+      </p:cxnSp>
+      <p:cxnSp>
+        <p:nvCxnSpPr>
+          <p:cNvPr id="18" name="Straight Arrow Connector 17">
+            <a:extLst>
+              <a:ext uri="{FF2B5EF4-FFF2-40B4-BE49-F238E27FC236}">
+                <a16:creationId xmlns:a16="http://schemas.microsoft.com/office/drawing/2014/main" id="{1F9EB7CE-47D2-C8C1-3717-6E5E736D540E}"/>
+              </a:ext>
+            </a:extLst>
+          </p:cNvPr>
+          <p:cNvCxnSpPr>
+            <a:cxnSpLocks/>
+          </p:cNvCxnSpPr>
+          <p:nvPr/>
+        </p:nvCxnSpPr>
+        <p:spPr>
+          <a:xfrm flipH="1">
+            <a:off x="8268903" y="3549921"/>
+            <a:ext cx="985013" cy="0"/>
+          </a:xfrm>
+          <a:prstGeom prst="straightConnector1">
+            <a:avLst/>
+          </a:prstGeom>
+          <a:ln>
+            <a:tailEnd type="triangle"/>
+          </a:ln>
+        </p:spPr>
+        <p:style>
+          <a:lnRef idx="1">
+            <a:schemeClr val="accent1"/>
+          </a:lnRef>
+          <a:fillRef idx="0">
+            <a:schemeClr val="accent1"/>
+          </a:fillRef>
+          <a:effectRef idx="0">
+            <a:schemeClr val="accent1"/>
+          </a:effectRef>
+          <a:fontRef idx="minor">
+            <a:schemeClr val="tx1"/>
+          </a:fontRef>
+        </p:style>
+      </p:cxnSp>
+      <p:cxnSp>
+        <p:nvCxnSpPr>
+          <p:cNvPr id="22" name="Straight Arrow Connector 21">
+            <a:extLst>
+              <a:ext uri="{FF2B5EF4-FFF2-40B4-BE49-F238E27FC236}">
+                <a16:creationId xmlns:a16="http://schemas.microsoft.com/office/drawing/2014/main" id="{0230B082-85C8-0365-8E9A-09A608362762}"/>
+              </a:ext>
+            </a:extLst>
+          </p:cNvPr>
+          <p:cNvCxnSpPr/>
+          <p:nvPr/>
+        </p:nvCxnSpPr>
+        <p:spPr>
+          <a:xfrm flipV="1">
+            <a:off x="3656006" y="3240307"/>
+            <a:ext cx="806905" cy="1"/>
+          </a:xfrm>
+          <a:prstGeom prst="straightConnector1">
+            <a:avLst/>
+          </a:prstGeom>
+          <a:ln>
+            <a:tailEnd type="triangle"/>
+          </a:ln>
+        </p:spPr>
+        <p:style>
+          <a:lnRef idx="1">
+            <a:schemeClr val="accent1"/>
+          </a:lnRef>
+          <a:fillRef idx="0">
+            <a:schemeClr val="accent1"/>
+          </a:fillRef>
+          <a:effectRef idx="0">
+            <a:schemeClr val="accent1"/>
+          </a:effectRef>
+          <a:fontRef idx="minor">
+            <a:schemeClr val="tx1"/>
+          </a:fontRef>
+        </p:style>
+      </p:cxnSp>
+      <p:cxnSp>
+        <p:nvCxnSpPr>
+          <p:cNvPr id="27" name="Straight Arrow Connector 26">
+            <a:extLst>
+              <a:ext uri="{FF2B5EF4-FFF2-40B4-BE49-F238E27FC236}">
+                <a16:creationId xmlns:a16="http://schemas.microsoft.com/office/drawing/2014/main" id="{D9DCB530-4C8D-84FD-4DDD-A6FF0790F65C}"/>
+              </a:ext>
+            </a:extLst>
+          </p:cNvPr>
+          <p:cNvCxnSpPr>
+            <a:cxnSpLocks/>
+          </p:cNvCxnSpPr>
+          <p:nvPr/>
+        </p:nvCxnSpPr>
+        <p:spPr>
+          <a:xfrm flipH="1">
+            <a:off x="5408595" y="3548319"/>
+            <a:ext cx="985013" cy="0"/>
+          </a:xfrm>
+          <a:prstGeom prst="straightConnector1">
+            <a:avLst/>
+          </a:prstGeom>
+          <a:ln>
+            <a:tailEnd type="triangle"/>
+          </a:ln>
+        </p:spPr>
+        <p:style>
+          <a:lnRef idx="1">
+            <a:schemeClr val="accent1"/>
+          </a:lnRef>
+          <a:fillRef idx="0">
+            <a:schemeClr val="accent1"/>
+          </a:fillRef>
+          <a:effectRef idx="0">
+            <a:schemeClr val="accent1"/>
+          </a:effectRef>
+          <a:fontRef idx="minor">
+            <a:schemeClr val="tx1"/>
+          </a:fontRef>
+        </p:style>
+      </p:cxnSp>
+      <p:cxnSp>
+        <p:nvCxnSpPr>
+          <p:cNvPr id="28" name="Straight Arrow Connector 27">
+            <a:extLst>
+              <a:ext uri="{FF2B5EF4-FFF2-40B4-BE49-F238E27FC236}">
+                <a16:creationId xmlns:a16="http://schemas.microsoft.com/office/drawing/2014/main" id="{4E950760-3D8D-9B59-089A-D12A3C002522}"/>
+              </a:ext>
+            </a:extLst>
+          </p:cNvPr>
+          <p:cNvCxnSpPr>
+            <a:cxnSpLocks/>
+          </p:cNvCxnSpPr>
+          <p:nvPr/>
+        </p:nvCxnSpPr>
+        <p:spPr>
+          <a:xfrm flipH="1">
+            <a:off x="2885173" y="3556342"/>
+            <a:ext cx="985013" cy="0"/>
+          </a:xfrm>
+          <a:prstGeom prst="straightConnector1">
+            <a:avLst/>
+          </a:prstGeom>
+          <a:ln>
+            <a:tailEnd type="triangle"/>
+          </a:ln>
+        </p:spPr>
+        <p:style>
+          <a:lnRef idx="1">
+            <a:schemeClr val="accent1"/>
+          </a:lnRef>
+          <a:fillRef idx="0">
+            <a:schemeClr val="accent1"/>
+          </a:fillRef>
+          <a:effectRef idx="0">
+            <a:schemeClr val="accent1"/>
+          </a:effectRef>
+          <a:fontRef idx="minor">
+            <a:schemeClr val="tx1"/>
+          </a:fontRef>
+        </p:style>
+      </p:cxnSp>
+      <p:cxnSp>
+        <p:nvCxnSpPr>
+          <p:cNvPr id="29" name="Straight Arrow Connector 28">
+            <a:extLst>
+              <a:ext uri="{FF2B5EF4-FFF2-40B4-BE49-F238E27FC236}">
+                <a16:creationId xmlns:a16="http://schemas.microsoft.com/office/drawing/2014/main" id="{2076F99F-4865-E34F-6BBC-8F2741D0D303}"/>
+              </a:ext>
+            </a:extLst>
+          </p:cNvPr>
+          <p:cNvCxnSpPr>
+            <a:cxnSpLocks/>
+          </p:cNvCxnSpPr>
+          <p:nvPr/>
+        </p:nvCxnSpPr>
+        <p:spPr>
+          <a:xfrm>
+            <a:off x="1741362" y="3272205"/>
+            <a:ext cx="0" cy="1272333"/>
+          </a:xfrm>
+          <a:prstGeom prst="straightConnector1">
+            <a:avLst/>
+          </a:prstGeom>
+          <a:ln>
+            <a:tailEnd type="triangle"/>
+          </a:ln>
+        </p:spPr>
+        <p:style>
+          <a:lnRef idx="1">
+            <a:schemeClr val="accent1"/>
+          </a:lnRef>
+          <a:fillRef idx="0">
+            <a:schemeClr val="accent1"/>
+          </a:fillRef>
+          <a:effectRef idx="0">
+            <a:schemeClr val="accent1"/>
+          </a:effectRef>
+          <a:fontRef idx="minor">
+            <a:schemeClr val="tx1"/>
+          </a:fontRef>
+        </p:style>
+      </p:cxnSp>
+      <p:cxnSp>
+        <p:nvCxnSpPr>
+          <p:cNvPr id="30" name="Straight Arrow Connector 29">
+            <a:extLst>
+              <a:ext uri="{FF2B5EF4-FFF2-40B4-BE49-F238E27FC236}">
+                <a16:creationId xmlns:a16="http://schemas.microsoft.com/office/drawing/2014/main" id="{2E3392EB-0AF2-CDC2-334D-6260CE5164DD}"/>
+              </a:ext>
+            </a:extLst>
+          </p:cNvPr>
+          <p:cNvCxnSpPr>
+            <a:cxnSpLocks/>
+            <a:stCxn id="11" idx="2"/>
+          </p:cNvCxnSpPr>
+          <p:nvPr/>
+        </p:nvCxnSpPr>
+        <p:spPr>
+          <a:xfrm flipV="1">
+            <a:off x="2853879" y="4895857"/>
+            <a:ext cx="983387" cy="3214"/>
+          </a:xfrm>
+          <a:prstGeom prst="straightConnector1">
+            <a:avLst/>
+          </a:prstGeom>
+          <a:ln>
+            <a:tailEnd type="triangle"/>
+          </a:ln>
+        </p:spPr>
+        <p:style>
+          <a:lnRef idx="1">
+            <a:schemeClr val="accent1"/>
+          </a:lnRef>
+          <a:fillRef idx="0">
+            <a:schemeClr val="accent1"/>
+          </a:fillRef>
+          <a:effectRef idx="0">
+            <a:schemeClr val="accent1"/>
+          </a:effectRef>
+          <a:fontRef idx="minor">
+            <a:schemeClr val="tx1"/>
+          </a:fontRef>
+        </p:style>
+      </p:cxnSp>
+      <p:sp>
+        <p:nvSpPr>
+          <p:cNvPr id="33" name="TextBox 32">
+            <a:extLst>
+              <a:ext uri="{FF2B5EF4-FFF2-40B4-BE49-F238E27FC236}">
+                <a16:creationId xmlns:a16="http://schemas.microsoft.com/office/drawing/2014/main" id="{FABE4C24-0DE7-F332-7A36-935F00B18A62}"/>
+              </a:ext>
+            </a:extLst>
+          </p:cNvPr>
+          <p:cNvSpPr txBox="1"/>
+          <p:nvPr/>
+        </p:nvSpPr>
+        <p:spPr>
+          <a:xfrm>
+            <a:off x="298383" y="403159"/>
+            <a:ext cx="11723571" cy="646331"/>
+          </a:xfrm>
+          <a:prstGeom prst="rect">
+            <a:avLst/>
+          </a:prstGeom>
+          <a:noFill/>
+        </p:spPr>
+        <p:txBody>
+          <a:bodyPr wrap="square" rtlCol="0">
+            <a:spAutoFit/>
+          </a:bodyPr>
+          <a:lstStyle/>
+          <a:p>
+            <a:r>
+              <a:rPr lang="en-US" dirty="0">
+                <a:latin typeface="+mj-lt"/>
+                <a:cs typeface="Calibri" panose="020F0502020204030204" pitchFamily="34" charset="0"/>
+              </a:rPr>
+              <a:t>DEVELOP AN ALGORITHM THAT TAKES AS INPUT TWO NAMES AND  THEIR CORRESPONDING AGE AND THEN SWAP THE AGES. </a:t>
+            </a:r>
+            <a:endParaRPr lang="en-US" dirty="0">
+              <a:latin typeface="+mj-lt"/>
+            </a:endParaRPr>
+          </a:p>
+          <a:p>
+            <a:endParaRPr lang="en-US" dirty="0"/>
+          </a:p>
+        </p:txBody>
+      </p:sp>
+    </p:spTree>
+    <p:extLst>
+      <p:ext uri="{BB962C8B-B14F-4D97-AF65-F5344CB8AC3E}">
+        <p14:creationId xmlns:p14="http://schemas.microsoft.com/office/powerpoint/2010/main" val="4039376344"/>
       </p:ext>
     </p:extLst>
   </p:cSld>

</xml_diff>